<commit_message>
Update ONIP Bloc 1 - Classes et Objets - Final Version
</commit_message>
<xml_diff>
--- a/ONIP/onip_b1_methodes_numeriques/seance4_classes/B1_3_Classes_et_objets.pptx
+++ b/ONIP/onip_b1_methodes_numeriques/seance4_classes/B1_3_Classes_et_objets.pptx
@@ -208,7 +208,7 @@
           <a:p>
             <a:fld id="{95F60532-AC81-4152-B45E-E054A978F780}" type="datetimeFigureOut">
               <a:rPr lang="fr-FR" smtClean="0"/>
-              <a:t>05/05/2023</a:t>
+              <a:t>30/08/2023</a:t>
             </a:fld>
             <a:endParaRPr lang="fr-FR"/>
           </a:p>
@@ -799,7 +799,7 @@
           <a:p>
             <a:fld id="{02AC24A9-CCB6-4F8D-B8DB-C2F3692CFA5A}" type="datetimeFigureOut">
               <a:rPr lang="en-US" smtClean="0"/>
-              <a:t>5/5/2023</a:t>
+              <a:t>8/30/2023</a:t>
             </a:fld>
             <a:endParaRPr lang="en-US" dirty="0"/>
           </a:p>
@@ -1169,7 +1169,7 @@
           <a:p>
             <a:fld id="{02AC24A9-CCB6-4F8D-B8DB-C2F3692CFA5A}" type="datetimeFigureOut">
               <a:rPr lang="en-US" smtClean="0"/>
-              <a:t>5/5/2023</a:t>
+              <a:t>8/30/2023</a:t>
             </a:fld>
             <a:endParaRPr lang="en-US"/>
           </a:p>
@@ -1378,7 +1378,7 @@
           <a:p>
             <a:fld id="{02AC24A9-CCB6-4F8D-B8DB-C2F3692CFA5A}" type="datetimeFigureOut">
               <a:rPr lang="en-US" smtClean="0"/>
-              <a:t>5/5/2023</a:t>
+              <a:t>8/30/2023</a:t>
             </a:fld>
             <a:endParaRPr lang="en-US"/>
           </a:p>
@@ -1848,7 +1848,7 @@
           <a:p>
             <a:fld id="{02AC24A9-CCB6-4F8D-B8DB-C2F3692CFA5A}" type="datetimeFigureOut">
               <a:rPr lang="en-US" smtClean="0"/>
-              <a:t>5/5/2023</a:t>
+              <a:t>8/30/2023</a:t>
             </a:fld>
             <a:endParaRPr lang="en-US"/>
           </a:p>
@@ -2302,7 +2302,7 @@
           <a:p>
             <a:fld id="{02AC24A9-CCB6-4F8D-B8DB-C2F3692CFA5A}" type="datetimeFigureOut">
               <a:rPr lang="en-US" smtClean="0"/>
-              <a:t>5/5/2023</a:t>
+              <a:t>8/30/2023</a:t>
             </a:fld>
             <a:endParaRPr lang="en-US"/>
           </a:p>
@@ -2834,7 +2834,7 @@
           <a:p>
             <a:fld id="{02AC24A9-CCB6-4F8D-B8DB-C2F3692CFA5A}" type="datetimeFigureOut">
               <a:rPr lang="en-US" smtClean="0"/>
-              <a:t>5/5/2023</a:t>
+              <a:t>8/30/2023</a:t>
             </a:fld>
             <a:endParaRPr lang="en-US"/>
           </a:p>
@@ -3533,7 +3533,7 @@
           <a:p>
             <a:fld id="{02AC24A9-CCB6-4F8D-B8DB-C2F3692CFA5A}" type="datetimeFigureOut">
               <a:rPr lang="en-US" smtClean="0"/>
-              <a:t>5/5/2023</a:t>
+              <a:t>8/30/2023</a:t>
             </a:fld>
             <a:endParaRPr lang="en-US"/>
           </a:p>
@@ -3862,7 +3862,7 @@
           <a:p>
             <a:fld id="{02AC24A9-CCB6-4F8D-B8DB-C2F3692CFA5A}" type="datetimeFigureOut">
               <a:rPr lang="en-US" smtClean="0"/>
-              <a:t>5/5/2023</a:t>
+              <a:t>8/30/2023</a:t>
             </a:fld>
             <a:endParaRPr lang="en-US"/>
           </a:p>
@@ -3975,7 +3975,7 @@
           <a:p>
             <a:fld id="{02AC24A9-CCB6-4F8D-B8DB-C2F3692CFA5A}" type="datetimeFigureOut">
               <a:rPr lang="en-US" smtClean="0"/>
-              <a:t>5/5/2023</a:t>
+              <a:t>8/30/2023</a:t>
             </a:fld>
             <a:endParaRPr lang="en-US"/>
           </a:p>
@@ -4470,7 +4470,7 @@
           <a:p>
             <a:fld id="{02AC24A9-CCB6-4F8D-B8DB-C2F3692CFA5A}" type="datetimeFigureOut">
               <a:rPr lang="en-US" smtClean="0"/>
-              <a:t>5/5/2023</a:t>
+              <a:t>8/30/2023</a:t>
             </a:fld>
             <a:endParaRPr lang="en-US" dirty="0"/>
           </a:p>
@@ -4947,7 +4947,7 @@
           <a:p>
             <a:fld id="{02AC24A9-CCB6-4F8D-B8DB-C2F3692CFA5A}" type="datetimeFigureOut">
               <a:rPr lang="en-US" smtClean="0"/>
-              <a:t>5/5/2023</a:t>
+              <a:t>8/30/2023</a:t>
             </a:fld>
             <a:endParaRPr lang="en-US"/>
           </a:p>
@@ -5190,7 +5190,7 @@
           <a:p>
             <a:fld id="{02AC24A9-CCB6-4F8D-B8DB-C2F3692CFA5A}" type="datetimeFigureOut">
               <a:rPr lang="en-US" smtClean="0"/>
-              <a:t>5/5/2023</a:t>
+              <a:t>8/30/2023</a:t>
             </a:fld>
             <a:endParaRPr lang="en-US"/>
           </a:p>
@@ -7182,7 +7182,7 @@
           <a:p>
             <a:r>
               <a:rPr lang="fr-FR" dirty="0"/>
-              <a:t>TODO</a:t>
+              <a:t>Des objets qui interagissent</a:t>
             </a:r>
           </a:p>
         </p:txBody>
@@ -7223,6 +7223,270 @@
           </a:prstGeom>
         </p:spPr>
       </p:pic>
+      <p:pic>
+        <p:nvPicPr>
+          <p:cNvPr id="1026" name="Picture 2">
+            <a:extLst>
+              <a:ext uri="{FF2B5EF4-FFF2-40B4-BE49-F238E27FC236}">
+                <a16:creationId xmlns:a16="http://schemas.microsoft.com/office/drawing/2014/main" id="{CE808304-C51F-0582-3AA5-5E8D676FA608}"/>
+              </a:ext>
+            </a:extLst>
+          </p:cNvPr>
+          <p:cNvPicPr>
+            <a:picLocks noChangeAspect="1" noChangeArrowheads="1"/>
+          </p:cNvPicPr>
+          <p:nvPr/>
+        </p:nvPicPr>
+        <p:blipFill>
+          <a:blip r:embed="rId3">
+            <a:extLst>
+              <a:ext uri="{28A0092B-C50C-407E-A947-70E740481C1C}">
+                <a14:useLocalDpi xmlns:a14="http://schemas.microsoft.com/office/drawing/2010/main" val="0"/>
+              </a:ext>
+            </a:extLst>
+          </a:blip>
+          <a:srcRect/>
+          <a:stretch>
+            <a:fillRect/>
+          </a:stretch>
+        </p:blipFill>
+        <p:spPr bwMode="auto">
+          <a:xfrm>
+            <a:off x="8002869" y="3311701"/>
+            <a:ext cx="3365527" cy="2622755"/>
+          </a:xfrm>
+          <a:prstGeom prst="rect">
+            <a:avLst/>
+          </a:prstGeom>
+          <a:noFill/>
+          <a:extLst>
+            <a:ext uri="{909E8E84-426E-40DD-AFC4-6F175D3DCCD1}">
+              <a14:hiddenFill xmlns:a14="http://schemas.microsoft.com/office/drawing/2010/main">
+                <a:solidFill>
+                  <a:srgbClr val="FFFFFF"/>
+                </a:solidFill>
+              </a14:hiddenFill>
+            </a:ext>
+          </a:extLst>
+        </p:spPr>
+      </p:pic>
+      <p:sp>
+        <p:nvSpPr>
+          <p:cNvPr id="6" name="ZoneTexte 5">
+            <a:extLst>
+              <a:ext uri="{FF2B5EF4-FFF2-40B4-BE49-F238E27FC236}">
+                <a16:creationId xmlns:a16="http://schemas.microsoft.com/office/drawing/2014/main" id="{640D37D6-80BE-E97D-B427-645E522B0AC0}"/>
+              </a:ext>
+            </a:extLst>
+          </p:cNvPr>
+          <p:cNvSpPr txBox="1"/>
+          <p:nvPr/>
+        </p:nvSpPr>
+        <p:spPr>
+          <a:xfrm>
+            <a:off x="7246374" y="6422654"/>
+            <a:ext cx="6096000" cy="261610"/>
+          </a:xfrm>
+          <a:prstGeom prst="rect">
+            <a:avLst/>
+          </a:prstGeom>
+          <a:noFill/>
+        </p:spPr>
+        <p:txBody>
+          <a:bodyPr wrap="square">
+            <a:spAutoFit/>
+          </a:bodyPr>
+          <a:lstStyle/>
+          <a:p>
+            <a:r>
+              <a:rPr lang="fr-FR" sz="1100" dirty="0">
+                <a:solidFill>
+                  <a:schemeClr val="bg1">
+                    <a:lumMod val="65000"/>
+                  </a:schemeClr>
+                </a:solidFill>
+              </a:rPr>
+              <a:t>https://www.maxicours.com/se/cours/les-diagrammes-objet-interaction/</a:t>
+            </a:r>
+          </a:p>
+        </p:txBody>
+      </p:sp>
+      <p:pic>
+        <p:nvPicPr>
+          <p:cNvPr id="1028" name="Picture 4" descr="dessin objets trouvés">
+            <a:extLst>
+              <a:ext uri="{FF2B5EF4-FFF2-40B4-BE49-F238E27FC236}">
+                <a16:creationId xmlns:a16="http://schemas.microsoft.com/office/drawing/2014/main" id="{4FAB4EBF-8600-BC7D-1B88-0C569F1A22AF}"/>
+              </a:ext>
+            </a:extLst>
+          </p:cNvPr>
+          <p:cNvPicPr>
+            <a:picLocks noChangeAspect="1" noChangeArrowheads="1"/>
+          </p:cNvPicPr>
+          <p:nvPr/>
+        </p:nvPicPr>
+        <p:blipFill>
+          <a:blip r:embed="rId4">
+            <a:extLst>
+              <a:ext uri="{28A0092B-C50C-407E-A947-70E740481C1C}">
+                <a14:useLocalDpi xmlns:a14="http://schemas.microsoft.com/office/drawing/2010/main" val="0"/>
+              </a:ext>
+            </a:extLst>
+          </a:blip>
+          <a:srcRect/>
+          <a:stretch>
+            <a:fillRect/>
+          </a:stretch>
+        </p:blipFill>
+        <p:spPr bwMode="auto">
+          <a:xfrm>
+            <a:off x="9091893" y="173736"/>
+            <a:ext cx="1906096" cy="1666069"/>
+          </a:xfrm>
+          <a:prstGeom prst="rect">
+            <a:avLst/>
+          </a:prstGeom>
+          <a:noFill/>
+          <a:extLst>
+            <a:ext uri="{909E8E84-426E-40DD-AFC4-6F175D3DCCD1}">
+              <a14:hiddenFill xmlns:a14="http://schemas.microsoft.com/office/drawing/2010/main">
+                <a:solidFill>
+                  <a:srgbClr val="FFFFFF"/>
+                </a:solidFill>
+              </a14:hiddenFill>
+            </a:ext>
+          </a:extLst>
+        </p:spPr>
+      </p:pic>
+      <p:pic>
+        <p:nvPicPr>
+          <p:cNvPr id="1030" name="Picture 6">
+            <a:extLst>
+              <a:ext uri="{FF2B5EF4-FFF2-40B4-BE49-F238E27FC236}">
+                <a16:creationId xmlns:a16="http://schemas.microsoft.com/office/drawing/2014/main" id="{E7D15BC2-D0C4-67BB-7185-7CFA4C2A7286}"/>
+              </a:ext>
+            </a:extLst>
+          </p:cNvPr>
+          <p:cNvPicPr>
+            <a:picLocks noChangeAspect="1" noChangeArrowheads="1"/>
+          </p:cNvPicPr>
+          <p:nvPr/>
+        </p:nvPicPr>
+        <p:blipFill>
+          <a:blip r:embed="rId5">
+            <a:extLst>
+              <a:ext uri="{28A0092B-C50C-407E-A947-70E740481C1C}">
+                <a14:useLocalDpi xmlns:a14="http://schemas.microsoft.com/office/drawing/2010/main" val="0"/>
+              </a:ext>
+            </a:extLst>
+          </a:blip>
+          <a:srcRect/>
+          <a:stretch>
+            <a:fillRect/>
+          </a:stretch>
+        </p:blipFill>
+        <p:spPr bwMode="auto">
+          <a:xfrm>
+            <a:off x="1115567" y="3193445"/>
+            <a:ext cx="6286500" cy="2733675"/>
+          </a:xfrm>
+          <a:prstGeom prst="rect">
+            <a:avLst/>
+          </a:prstGeom>
+          <a:noFill/>
+          <a:extLst>
+            <a:ext uri="{909E8E84-426E-40DD-AFC4-6F175D3DCCD1}">
+              <a14:hiddenFill xmlns:a14="http://schemas.microsoft.com/office/drawing/2010/main">
+                <a:solidFill>
+                  <a:srgbClr val="FFFFFF"/>
+                </a:solidFill>
+              </a14:hiddenFill>
+            </a:ext>
+          </a:extLst>
+        </p:spPr>
+      </p:pic>
+      <p:sp>
+        <p:nvSpPr>
+          <p:cNvPr id="8" name="ZoneTexte 7">
+            <a:extLst>
+              <a:ext uri="{FF2B5EF4-FFF2-40B4-BE49-F238E27FC236}">
+                <a16:creationId xmlns:a16="http://schemas.microsoft.com/office/drawing/2014/main" id="{7AEDF02C-01A4-42CC-4130-D41A78D297E7}"/>
+              </a:ext>
+            </a:extLst>
+          </p:cNvPr>
+          <p:cNvSpPr txBox="1"/>
+          <p:nvPr/>
+        </p:nvSpPr>
+        <p:spPr>
+          <a:xfrm>
+            <a:off x="3014446" y="5916945"/>
+            <a:ext cx="6671186" cy="261610"/>
+          </a:xfrm>
+          <a:prstGeom prst="rect">
+            <a:avLst/>
+          </a:prstGeom>
+          <a:noFill/>
+        </p:spPr>
+        <p:txBody>
+          <a:bodyPr wrap="square">
+            <a:spAutoFit/>
+          </a:bodyPr>
+          <a:lstStyle/>
+          <a:p>
+            <a:r>
+              <a:rPr lang="fr-FR" sz="1100" dirty="0">
+                <a:solidFill>
+                  <a:schemeClr val="bg1">
+                    <a:lumMod val="65000"/>
+                  </a:schemeClr>
+                </a:solidFill>
+              </a:rPr>
+              <a:t>https://www.lepoint.fr/dossiers/societe/velo-libre-service-velib/</a:t>
+            </a:r>
+          </a:p>
+        </p:txBody>
+      </p:sp>
+      <p:sp>
+        <p:nvSpPr>
+          <p:cNvPr id="10" name="ZoneTexte 9">
+            <a:extLst>
+              <a:ext uri="{FF2B5EF4-FFF2-40B4-BE49-F238E27FC236}">
+                <a16:creationId xmlns:a16="http://schemas.microsoft.com/office/drawing/2014/main" id="{27659C81-78E9-598C-A413-7A9690518BE2}"/>
+              </a:ext>
+            </a:extLst>
+          </p:cNvPr>
+          <p:cNvSpPr txBox="1"/>
+          <p:nvPr/>
+        </p:nvSpPr>
+        <p:spPr>
+          <a:xfrm>
+            <a:off x="9421762" y="2051002"/>
+            <a:ext cx="2671915" cy="261610"/>
+          </a:xfrm>
+          <a:prstGeom prst="rect">
+            <a:avLst/>
+          </a:prstGeom>
+          <a:noFill/>
+        </p:spPr>
+        <p:txBody>
+          <a:bodyPr wrap="square">
+            <a:spAutoFit/>
+          </a:bodyPr>
+          <a:lstStyle/>
+          <a:p>
+            <a:r>
+              <a:rPr lang="fr-FR" sz="1050" dirty="0">
+                <a:solidFill>
+                  <a:schemeClr val="bg1">
+                    <a:lumMod val="65000"/>
+                  </a:schemeClr>
+                </a:solidFill>
+              </a:rPr>
+              <a:t>https://masevaux.fr/objets_trouves/</a:t>
+            </a:r>
+          </a:p>
+        </p:txBody>
+      </p:sp>
     </p:spTree>
     <p:extLst>
       <p:ext uri="{BB962C8B-B14F-4D97-AF65-F5344CB8AC3E}">
@@ -7297,14 +7561,19 @@
             <p:ph sz="half" idx="1"/>
           </p:nvPr>
         </p:nvSpPr>
-        <p:spPr/>
+        <p:spPr>
+          <a:xfrm>
+            <a:off x="1115568" y="2478024"/>
+            <a:ext cx="5344226" cy="3694176"/>
+          </a:xfrm>
+        </p:spPr>
         <p:txBody>
           <a:bodyPr/>
           <a:lstStyle/>
           <a:p>
             <a:r>
               <a:rPr lang="fr-FR" dirty="0"/>
-              <a:t>TODO</a:t>
+              <a:t>Mise en œuvre informatique</a:t>
             </a:r>
           </a:p>
         </p:txBody>
@@ -7367,14 +7636,102 @@
         </p:blipFill>
         <p:spPr>
           <a:xfrm>
-            <a:off x="5796284" y="3102470"/>
-            <a:ext cx="5624806" cy="2445283"/>
+            <a:off x="972500" y="3762167"/>
+            <a:ext cx="4873700" cy="2118753"/>
           </a:xfrm>
           <a:prstGeom prst="rect">
             <a:avLst/>
           </a:prstGeom>
         </p:spPr>
       </p:pic>
+      <p:pic>
+        <p:nvPicPr>
+          <p:cNvPr id="2050" name="Picture 2">
+            <a:extLst>
+              <a:ext uri="{FF2B5EF4-FFF2-40B4-BE49-F238E27FC236}">
+                <a16:creationId xmlns:a16="http://schemas.microsoft.com/office/drawing/2014/main" id="{9D885C64-E2BC-CBB0-EEDE-062889DD079C}"/>
+              </a:ext>
+            </a:extLst>
+          </p:cNvPr>
+          <p:cNvPicPr>
+            <a:picLocks noChangeAspect="1" noChangeArrowheads="1"/>
+          </p:cNvPicPr>
+          <p:nvPr/>
+        </p:nvPicPr>
+        <p:blipFill>
+          <a:blip r:embed="rId4">
+            <a:extLst>
+              <a:ext uri="{28A0092B-C50C-407E-A947-70E740481C1C}">
+                <a14:useLocalDpi xmlns:a14="http://schemas.microsoft.com/office/drawing/2010/main" val="0"/>
+              </a:ext>
+            </a:extLst>
+          </a:blip>
+          <a:srcRect/>
+          <a:stretch>
+            <a:fillRect/>
+          </a:stretch>
+        </p:blipFill>
+        <p:spPr bwMode="auto">
+          <a:xfrm>
+            <a:off x="6602862" y="2220930"/>
+            <a:ext cx="5141249" cy="4481138"/>
+          </a:xfrm>
+          <a:prstGeom prst="rect">
+            <a:avLst/>
+          </a:prstGeom>
+          <a:noFill/>
+          <a:extLst>
+            <a:ext uri="{909E8E84-426E-40DD-AFC4-6F175D3DCCD1}">
+              <a14:hiddenFill xmlns:a14="http://schemas.microsoft.com/office/drawing/2010/main">
+                <a:solidFill>
+                  <a:srgbClr val="FFFFFF"/>
+                </a:solidFill>
+              </a14:hiddenFill>
+            </a:ext>
+          </a:extLst>
+        </p:spPr>
+      </p:pic>
+      <p:sp>
+        <p:nvSpPr>
+          <p:cNvPr id="6" name="ZoneTexte 5">
+            <a:extLst>
+              <a:ext uri="{FF2B5EF4-FFF2-40B4-BE49-F238E27FC236}">
+                <a16:creationId xmlns:a16="http://schemas.microsoft.com/office/drawing/2014/main" id="{75CCEE1C-7657-3A68-2741-60D43D501772}"/>
+              </a:ext>
+            </a:extLst>
+          </p:cNvPr>
+          <p:cNvSpPr txBox="1"/>
+          <p:nvPr/>
+        </p:nvSpPr>
+        <p:spPr>
+          <a:xfrm>
+            <a:off x="8029399" y="6596390"/>
+            <a:ext cx="4162601" cy="261610"/>
+          </a:xfrm>
+          <a:prstGeom prst="rect">
+            <a:avLst/>
+          </a:prstGeom>
+          <a:noFill/>
+        </p:spPr>
+        <p:txBody>
+          <a:bodyPr wrap="square">
+            <a:spAutoFit/>
+          </a:bodyPr>
+          <a:lstStyle/>
+          <a:p>
+            <a:r>
+              <a:rPr lang="fr-FR" sz="1100" dirty="0">
+                <a:solidFill>
+                  <a:schemeClr val="bg1">
+                    <a:lumMod val="65000"/>
+                  </a:schemeClr>
+                </a:solidFill>
+              </a:rPr>
+              <a:t>https://python3.info/design-patterns/uml/class-diagram.html</a:t>
+            </a:r>
+          </a:p>
+        </p:txBody>
+      </p:sp>
     </p:spTree>
     <p:extLst>
       <p:ext uri="{BB962C8B-B14F-4D97-AF65-F5344CB8AC3E}">

</xml_diff>